<commit_message>
Updating figures with age-stratified infection probabilities
</commit_message>
<xml_diff>
--- a/figures/schematic_modified.pptx
+++ b/figures/schematic_modified.pptx
@@ -3349,19 +3349,17 @@
       </p:grpSpPr>
       <p:pic>
         <p:nvPicPr>
-          <p:cNvPr id="5" name="Content Placeholder 4" descr="A graph of different colored lines&#10;&#10;AI-generated content may be incorrect.">
-            <a:extLst>
-              <a:ext uri="{FF2B5EF4-FFF2-40B4-BE49-F238E27FC236}">
-                <a16:creationId xmlns:a16="http://schemas.microsoft.com/office/drawing/2014/main" id="{EE474A51-7917-FBA1-7B20-4F09D8FF1DE0}"/>
+          <p:cNvPr id="12" name="Picture 11">
+            <a:extLst>
+              <a:ext uri="{FF2B5EF4-FFF2-40B4-BE49-F238E27FC236}">
+                <a16:creationId xmlns:a16="http://schemas.microsoft.com/office/drawing/2014/main" id="{094A6817-2607-B497-E526-D2596A38FB34}"/>
               </a:ext>
             </a:extLst>
           </p:cNvPr>
           <p:cNvPicPr>
-            <a:picLocks noGrp="1" noChangeAspect="1"/>
+            <a:picLocks noChangeAspect="1"/>
           </p:cNvPicPr>
-          <p:nvPr>
-            <p:ph idx="1"/>
-          </p:nvPr>
+          <p:nvPr/>
         </p:nvPicPr>
         <p:blipFill>
           <a:blip r:embed="rId2"/>
@@ -3371,12 +3369,12 @@
         </p:blipFill>
         <p:spPr>
           <a:xfrm>
-            <a:off x="127065" y="1023315"/>
-            <a:ext cx="11711325" cy="5019139"/>
+            <a:off x="179045" y="1078693"/>
+            <a:ext cx="11544642" cy="4947704"/>
           </a:xfrm>
-          <a:ln>
-            <a:noFill/>
-          </a:ln>
+          <a:prstGeom prst="rect">
+            <a:avLst/>
+          </a:prstGeom>
         </p:spPr>
       </p:pic>
       <p:sp>
@@ -3393,7 +3391,7 @@
         </p:nvSpPr>
         <p:spPr>
           <a:xfrm>
-            <a:off x="1925174" y="4409714"/>
+            <a:off x="1925174" y="4384138"/>
             <a:ext cx="184978" cy="501190"/>
           </a:xfrm>
           <a:prstGeom prst="leftBrace">
@@ -3616,7 +3614,7 @@
             </p:nvSpPr>
             <p:spPr>
               <a:xfrm>
-                <a:off x="1379620" y="4415304"/>
+                <a:off x="1379620" y="4421698"/>
                 <a:ext cx="527863" cy="325282"/>
               </a:xfrm>
               <a:prstGeom prst="rect">
@@ -3689,7 +3687,7 @@
             </p:nvSpPr>
             <p:spPr>
               <a:xfrm>
-                <a:off x="1379620" y="4415304"/>
+                <a:off x="1379620" y="4421698"/>
                 <a:ext cx="527863" cy="325282"/>
               </a:xfrm>
               <a:prstGeom prst="rect">
@@ -3698,7 +3696,7 @@
               <a:blipFill>
                 <a:blip r:embed="rId4"/>
                 <a:stretch>
-                  <a:fillRect r="-2326"/>
+                  <a:fillRect r="-2326" b="-3846"/>
                 </a:stretch>
               </a:blipFill>
             </p:spPr>
@@ -3733,8 +3731,8 @@
         </p:nvCxnSpPr>
         <p:spPr>
           <a:xfrm>
-            <a:off x="2775172" y="3429000"/>
-            <a:ext cx="396453" cy="0"/>
+            <a:off x="2832722" y="3429000"/>
+            <a:ext cx="338903" cy="0"/>
           </a:xfrm>
           <a:prstGeom prst="line">
             <a:avLst/>
@@ -5084,7 +5082,7 @@
           <p:nvPr>
             <p:extLst>
               <p:ext uri="{D42A27DB-BD31-4B8C-83A1-F6EECF244321}">
-                <p14:modId xmlns:p14="http://schemas.microsoft.com/office/powerpoint/2010/main" val="2564613424"/>
+                <p14:modId xmlns:p14="http://schemas.microsoft.com/office/powerpoint/2010/main" val="3264938607"/>
               </p:ext>
             </p:extLst>
           </p:nvPr>

</xml_diff>

<commit_message>
Running final results and moved old files
</commit_message>
<xml_diff>
--- a/figures/schematic_modified.pptx
+++ b/figures/schematic_modified.pptx
@@ -3369,8 +3369,8 @@
         </p:blipFill>
         <p:spPr>
           <a:xfrm>
-            <a:off x="179045" y="1078693"/>
-            <a:ext cx="11544642" cy="4947704"/>
+            <a:off x="179046" y="1078693"/>
+            <a:ext cx="11541599" cy="4946400"/>
           </a:xfrm>
           <a:prstGeom prst="rect">
             <a:avLst/>
@@ -5082,7 +5082,7 @@
           <p:nvPr>
             <p:extLst>
               <p:ext uri="{D42A27DB-BD31-4B8C-83A1-F6EECF244321}">
-                <p14:modId xmlns:p14="http://schemas.microsoft.com/office/powerpoint/2010/main" val="3264938607"/>
+                <p14:modId xmlns:p14="http://schemas.microsoft.com/office/powerpoint/2010/main" val="3310846648"/>
               </p:ext>
             </p:extLst>
           </p:nvPr>
@@ -6312,6 +6312,41 @@
                 <a:cs typeface="Arial" panose="020B0604020202020204" pitchFamily="34" charset="0"/>
               </a:rPr>
               <a:t>Infection history</a:t>
+            </a:r>
+          </a:p>
+        </p:txBody>
+      </p:sp>
+      <p:sp>
+        <p:nvSpPr>
+          <p:cNvPr id="17" name="TextBox 16">
+            <a:extLst>
+              <a:ext uri="{FF2B5EF4-FFF2-40B4-BE49-F238E27FC236}">
+                <a16:creationId xmlns:a16="http://schemas.microsoft.com/office/drawing/2014/main" id="{1B260B56-7F74-5A42-45F5-B900344D61E0}"/>
+              </a:ext>
+            </a:extLst>
+          </p:cNvPr>
+          <p:cNvSpPr txBox="1"/>
+          <p:nvPr/>
+        </p:nvSpPr>
+        <p:spPr>
+          <a:xfrm>
+            <a:off x="8862646" y="127888"/>
+            <a:ext cx="2186887" cy="369332"/>
+          </a:xfrm>
+          <a:prstGeom prst="rect">
+            <a:avLst/>
+          </a:prstGeom>
+          <a:noFill/>
+        </p:spPr>
+        <p:txBody>
+          <a:bodyPr wrap="square" rtlCol="0">
+            <a:spAutoFit/>
+          </a:bodyPr>
+          <a:lstStyle/>
+          <a:p>
+            <a:r>
+              <a:rPr lang="en-US" dirty="0"/>
+              <a:t>13.74 x 32.06 cm</a:t>
             </a:r>
           </a:p>
         </p:txBody>

</xml_diff>